<commit_message>
minor mistake in presentation repaired
</commit_message>
<xml_diff>
--- a/Tuatara Challenge.pptx
+++ b/Tuatara Challenge.pptx
@@ -827,11 +827,11 @@
           <c:showPercent val="0"/>
           <c:showBubbleSize val="0"/>
         </c:dLbls>
-        <c:axId val="-1152392816"/>
-        <c:axId val="-1380093936"/>
+        <c:axId val="-139312656"/>
+        <c:axId val="-139312112"/>
       </c:scatterChart>
       <c:valAx>
-        <c:axId val="-1152392816"/>
+        <c:axId val="-139312656"/>
         <c:scaling>
           <c:orientation val="minMax"/>
         </c:scaling>
@@ -888,12 +888,12 @@
             <a:endParaRPr lang="en-US"/>
           </a:p>
         </c:txPr>
-        <c:crossAx val="-1380093936"/>
+        <c:crossAx val="-139312112"/>
         <c:crosses val="autoZero"/>
         <c:crossBetween val="midCat"/>
       </c:valAx>
       <c:valAx>
-        <c:axId val="-1380093936"/>
+        <c:axId val="-139312112"/>
         <c:scaling>
           <c:orientation val="minMax"/>
         </c:scaling>
@@ -950,7 +950,7 @@
             <a:endParaRPr lang="en-US"/>
           </a:p>
         </c:txPr>
-        <c:crossAx val="-1152392816"/>
+        <c:crossAx val="-139312656"/>
         <c:crosses val="autoZero"/>
         <c:crossBetween val="midCat"/>
       </c:valAx>
@@ -1717,11 +1717,11 @@
           <c:showPercent val="0"/>
           <c:showBubbleSize val="0"/>
         </c:dLbls>
-        <c:axId val="-1380105360"/>
-        <c:axId val="-1380105904"/>
+        <c:axId val="-139314288"/>
+        <c:axId val="-139311568"/>
       </c:scatterChart>
       <c:valAx>
-        <c:axId val="-1380105360"/>
+        <c:axId val="-139314288"/>
         <c:scaling>
           <c:orientation val="minMax"/>
         </c:scaling>
@@ -1778,12 +1778,12 @@
             <a:endParaRPr lang="en-US"/>
           </a:p>
         </c:txPr>
-        <c:crossAx val="-1380105904"/>
+        <c:crossAx val="-139311568"/>
         <c:crosses val="autoZero"/>
         <c:crossBetween val="midCat"/>
       </c:valAx>
       <c:valAx>
-        <c:axId val="-1380105904"/>
+        <c:axId val="-139311568"/>
         <c:scaling>
           <c:orientation val="minMax"/>
         </c:scaling>
@@ -1840,7 +1840,7 @@
             <a:endParaRPr lang="en-US"/>
           </a:p>
         </c:txPr>
-        <c:crossAx val="-1380105360"/>
+        <c:crossAx val="-139314288"/>
         <c:crosses val="autoZero"/>
         <c:crossBetween val="midCat"/>
       </c:valAx>
@@ -3154,7 +3154,7 @@
           <a:p>
             <a:fld id="{34CC4FA9-4657-4406-916E-7E640662EA5A}" type="datetimeFigureOut">
               <a:rPr lang="en-GB" smtClean="0"/>
-              <a:t>25/11/2016</a:t>
+              <a:t>28/11/2016</a:t>
             </a:fld>
             <a:endParaRPr lang="en-GB"/>
           </a:p>
@@ -3324,7 +3324,7 @@
           <a:p>
             <a:fld id="{34CC4FA9-4657-4406-916E-7E640662EA5A}" type="datetimeFigureOut">
               <a:rPr lang="en-GB" smtClean="0"/>
-              <a:t>25/11/2016</a:t>
+              <a:t>28/11/2016</a:t>
             </a:fld>
             <a:endParaRPr lang="en-GB"/>
           </a:p>
@@ -3504,7 +3504,7 @@
           <a:p>
             <a:fld id="{34CC4FA9-4657-4406-916E-7E640662EA5A}" type="datetimeFigureOut">
               <a:rPr lang="en-GB" smtClean="0"/>
-              <a:t>25/11/2016</a:t>
+              <a:t>28/11/2016</a:t>
             </a:fld>
             <a:endParaRPr lang="en-GB"/>
           </a:p>
@@ -3674,7 +3674,7 @@
           <a:p>
             <a:fld id="{34CC4FA9-4657-4406-916E-7E640662EA5A}" type="datetimeFigureOut">
               <a:rPr lang="en-GB" smtClean="0"/>
-              <a:t>25/11/2016</a:t>
+              <a:t>28/11/2016</a:t>
             </a:fld>
             <a:endParaRPr lang="en-GB"/>
           </a:p>
@@ -3920,7 +3920,7 @@
           <a:p>
             <a:fld id="{34CC4FA9-4657-4406-916E-7E640662EA5A}" type="datetimeFigureOut">
               <a:rPr lang="en-GB" smtClean="0"/>
-              <a:t>25/11/2016</a:t>
+              <a:t>28/11/2016</a:t>
             </a:fld>
             <a:endParaRPr lang="en-GB"/>
           </a:p>
@@ -4152,7 +4152,7 @@
           <a:p>
             <a:fld id="{34CC4FA9-4657-4406-916E-7E640662EA5A}" type="datetimeFigureOut">
               <a:rPr lang="en-GB" smtClean="0"/>
-              <a:t>25/11/2016</a:t>
+              <a:t>28/11/2016</a:t>
             </a:fld>
             <a:endParaRPr lang="en-GB"/>
           </a:p>
@@ -4519,7 +4519,7 @@
           <a:p>
             <a:fld id="{34CC4FA9-4657-4406-916E-7E640662EA5A}" type="datetimeFigureOut">
               <a:rPr lang="en-GB" smtClean="0"/>
-              <a:t>25/11/2016</a:t>
+              <a:t>28/11/2016</a:t>
             </a:fld>
             <a:endParaRPr lang="en-GB"/>
           </a:p>
@@ -4637,7 +4637,7 @@
           <a:p>
             <a:fld id="{34CC4FA9-4657-4406-916E-7E640662EA5A}" type="datetimeFigureOut">
               <a:rPr lang="en-GB" smtClean="0"/>
-              <a:t>25/11/2016</a:t>
+              <a:t>28/11/2016</a:t>
             </a:fld>
             <a:endParaRPr lang="en-GB"/>
           </a:p>
@@ -4732,7 +4732,7 @@
           <a:p>
             <a:fld id="{34CC4FA9-4657-4406-916E-7E640662EA5A}" type="datetimeFigureOut">
               <a:rPr lang="en-GB" smtClean="0"/>
-              <a:t>25/11/2016</a:t>
+              <a:t>28/11/2016</a:t>
             </a:fld>
             <a:endParaRPr lang="en-GB"/>
           </a:p>
@@ -5009,7 +5009,7 @@
           <a:p>
             <a:fld id="{34CC4FA9-4657-4406-916E-7E640662EA5A}" type="datetimeFigureOut">
               <a:rPr lang="en-GB" smtClean="0"/>
-              <a:t>25/11/2016</a:t>
+              <a:t>28/11/2016</a:t>
             </a:fld>
             <a:endParaRPr lang="en-GB"/>
           </a:p>
@@ -5262,7 +5262,7 @@
           <a:p>
             <a:fld id="{34CC4FA9-4657-4406-916E-7E640662EA5A}" type="datetimeFigureOut">
               <a:rPr lang="en-GB" smtClean="0"/>
-              <a:t>25/11/2016</a:t>
+              <a:t>28/11/2016</a:t>
             </a:fld>
             <a:endParaRPr lang="en-GB"/>
           </a:p>
@@ -5475,7 +5475,7 @@
           <a:p>
             <a:fld id="{34CC4FA9-4657-4406-916E-7E640662EA5A}" type="datetimeFigureOut">
               <a:rPr lang="en-GB" smtClean="0"/>
-              <a:t>25/11/2016</a:t>
+              <a:t>28/11/2016</a:t>
             </a:fld>
             <a:endParaRPr lang="en-GB"/>
           </a:p>
@@ -6605,8 +6605,8 @@
           </a:p>
         </p:txBody>
       </p:sp>
-      <mc:AlternateContent xmlns:mc="http://schemas.openxmlformats.org/markup-compatibility/2006">
-        <mc:Choice xmlns:a14="http://schemas.microsoft.com/office/drawing/2010/main" Requires="a14">
+      <mc:AlternateContent xmlns:mc="http://schemas.openxmlformats.org/markup-compatibility/2006" xmlns:a14="http://schemas.microsoft.com/office/drawing/2010/main">
+        <mc:Choice Requires="a14">
           <p:sp>
             <p:nvSpPr>
               <p:cNvPr id="3" name="Content Placeholder 2"/>
@@ -6793,7 +6793,7 @@
             </p:txBody>
           </p:sp>
         </mc:Choice>
-        <mc:Fallback>
+        <mc:Fallback xmlns="">
           <p:sp>
             <p:nvSpPr>
               <p:cNvPr id="3" name="Content Placeholder 2"/>
@@ -6874,18 +6874,14 @@
           <a:p>
             <a:r>
               <a:rPr lang="pl-PL" dirty="0" smtClean="0"/>
-              <a:t>Próba poprawienia </a:t>
-            </a:r>
-            <a:r>
-              <a:rPr lang="pl-PL" dirty="0" smtClean="0"/>
-              <a:t>predykcji</a:t>
+              <a:t>Próba poprawienia predykcji</a:t>
             </a:r>
             <a:endParaRPr lang="en-GB" dirty="0"/>
           </a:p>
         </p:txBody>
       </p:sp>
-      <mc:AlternateContent xmlns:mc="http://schemas.openxmlformats.org/markup-compatibility/2006">
-        <mc:Choice xmlns:a14="http://schemas.microsoft.com/office/drawing/2010/main" Requires="a14">
+      <mc:AlternateContent xmlns:mc="http://schemas.openxmlformats.org/markup-compatibility/2006" xmlns:a14="http://schemas.microsoft.com/office/drawing/2010/main">
+        <mc:Choice Requires="a14">
           <p:sp>
             <p:nvSpPr>
               <p:cNvPr id="3" name="Content Placeholder 2"/>
@@ -6958,19 +6954,7 @@
               <a:p>
                 <a:r>
                   <a:rPr lang="pl-PL" dirty="0" smtClean="0"/>
-                  <a:t>W </a:t>
-                </a:r>
-                <a:r>
-                  <a:rPr lang="pl-PL" dirty="0" smtClean="0"/>
-                  <a:t>celu poprawienia </a:t>
-                </a:r>
-                <a:r>
-                  <a:rPr lang="pl-PL" dirty="0" smtClean="0"/>
-                  <a:t>predykcji modeli liniowych </a:t>
-                </a:r>
-                <a:r>
-                  <a:rPr lang="pl-PL" dirty="0" smtClean="0"/>
-                  <a:t>próbowano znaleźć:</a:t>
+                  <a:t>W celu poprawienia predykcji modeli liniowych próbowano znaleźć:</a:t>
                 </a:r>
               </a:p>
               <a:p>
@@ -6984,11 +6968,7 @@
                 <a:pPr lvl="1"/>
                 <a:r>
                   <a:rPr lang="pl-PL" dirty="0" smtClean="0"/>
-                  <a:t>Wśród zmiennych najmocniej skorelowanych z wartością odszkodowania wybrać do regresji te, któe najsłabiej korelują ze </a:t>
-                </a:r>
-                <a:r>
-                  <a:rPr lang="pl-PL" dirty="0" smtClean="0"/>
-                  <a:t>sobą</a:t>
+                  <a:t>Wśród zmiennych najmocniej skorelowanych z wartością odszkodowania wybrać do regresji te, któe najsłabiej korelują ze sobą</a:t>
                 </a:r>
               </a:p>
               <a:p>
@@ -7013,7 +6993,7 @@
             </p:txBody>
           </p:sp>
         </mc:Choice>
-        <mc:Fallback>
+        <mc:Fallback xmlns="">
           <p:sp>
             <p:nvSpPr>
               <p:cNvPr id="3" name="Content Placeholder 2"/>
@@ -7141,7 +7121,7 @@
               <p:nvPr>
                 <p:extLst>
                   <p:ext uri="{D42A27DB-BD31-4B8C-83A1-F6EECF244321}">
-                    <p14:modId xmlns:p14="http://schemas.microsoft.com/office/powerpoint/2010/main" val="2939008092"/>
+                    <p14:modId xmlns:p14="http://schemas.microsoft.com/office/powerpoint/2010/main" val="2190608469"/>
                   </p:ext>
                 </p:extLst>
               </p:nvPr>
@@ -7229,11 +7209,7 @@
                         <a:p>
                           <a:r>
                             <a:rPr lang="pl-PL" dirty="0" smtClean="0"/>
-                            <a:t>Zbiór danych „</a:t>
-                          </a:r>
-                          <a:r>
-                            <a:rPr lang="pl-PL" dirty="0" smtClean="0"/>
-                            <a:t>case2”</a:t>
+                            <a:t>Zbiór danych „case2”</a:t>
                           </a:r>
                           <a:endParaRPr lang="en-GB" dirty="0"/>
                         </a:p>
@@ -7815,7 +7791,7 @@
                         <a:p>
                           <a:r>
                             <a:rPr lang="pl-PL" dirty="0" smtClean="0"/>
-                            <a:t>RMSE</a:t>
+                            <a:t>MSE</a:t>
                           </a:r>
                           <a:endParaRPr lang="en-GB" dirty="0"/>
                         </a:p>
@@ -7941,6 +7917,7 @@
                         <a:bodyPr/>
                         <a:lstStyle/>
                         <a:p>
+                          <a:pPr/>
                           <a14:m>
                             <m:oMathPara xmlns:m="http://schemas.openxmlformats.org/officeDocument/2006/math">
                               <m:oMathParaPr>
@@ -8133,7 +8110,7 @@
               <p:nvPr>
                 <p:extLst>
                   <p:ext uri="{D42A27DB-BD31-4B8C-83A1-F6EECF244321}">
-                    <p14:modId xmlns:p14="http://schemas.microsoft.com/office/powerpoint/2010/main" val="2939008092"/>
+                    <p14:modId xmlns:p14="http://schemas.microsoft.com/office/powerpoint/2010/main" val="2190608469"/>
                   </p:ext>
                 </p:extLst>
               </p:nvPr>
@@ -8221,11 +8198,7 @@
                         <a:p>
                           <a:r>
                             <a:rPr lang="pl-PL" dirty="0" smtClean="0"/>
-                            <a:t>Zbiór danych „</a:t>
-                          </a:r>
-                          <a:r>
-                            <a:rPr lang="pl-PL" dirty="0" smtClean="0"/>
-                            <a:t>case2”</a:t>
+                            <a:t>Zbiór danych „case2”</a:t>
                           </a:r>
                           <a:endParaRPr lang="en-GB" dirty="0"/>
                         </a:p>
@@ -8807,7 +8780,7 @@
                         <a:p>
                           <a:r>
                             <a:rPr lang="pl-PL" dirty="0" smtClean="0"/>
-                            <a:t>RMSE</a:t>
+                            <a:t>MSE</a:t>
                           </a:r>
                           <a:endParaRPr lang="en-GB" dirty="0"/>
                         </a:p>
@@ -9234,8 +9207,8 @@
           </a:p>
         </p:txBody>
       </p:sp>
-      <mc:AlternateContent xmlns:mc="http://schemas.openxmlformats.org/markup-compatibility/2006">
-        <mc:Choice xmlns:a14="http://schemas.microsoft.com/office/drawing/2010/main" Requires="a14">
+      <mc:AlternateContent xmlns:mc="http://schemas.openxmlformats.org/markup-compatibility/2006" xmlns:a14="http://schemas.microsoft.com/office/drawing/2010/main">
+        <mc:Choice Requires="a14">
           <p:sp>
             <p:nvSpPr>
               <p:cNvPr id="3" name="Content Placeholder 2"/>
@@ -9303,7 +9276,7 @@
             </p:txBody>
           </p:sp>
         </mc:Choice>
-        <mc:Fallback>
+        <mc:Fallback xmlns="">
           <p:sp>
             <p:nvSpPr>
               <p:cNvPr id="3" name="Content Placeholder 2"/>
@@ -9784,7 +9757,6 @@
               <a:rPr lang="pl-PL" dirty="0" smtClean="0"/>
               <a:t>Poszerzenie wiedzy na temat regresji liniowej oraz wykorzystywanych algorytmów</a:t>
             </a:r>
-            <a:endParaRPr lang="pl-PL" dirty="0" smtClean="0"/>
           </a:p>
         </p:txBody>
       </p:sp>
@@ -9842,11 +9814,7 @@
           <a:p>
             <a:r>
               <a:rPr lang="pl-PL" dirty="0" smtClean="0"/>
-              <a:t>Plan </a:t>
-            </a:r>
-            <a:r>
-              <a:rPr lang="pl-PL" dirty="0" smtClean="0"/>
-              <a:t>prezentacji:</a:t>
+              <a:t>Plan prezentacji:</a:t>
             </a:r>
             <a:endParaRPr lang="en-GB" dirty="0"/>
           </a:p>
@@ -9871,7 +9839,6 @@
               <a:rPr lang="pl-PL" dirty="0" smtClean="0"/>
               <a:t>Założenia wstępne</a:t>
             </a:r>
-            <a:endParaRPr lang="pl-PL" dirty="0" smtClean="0"/>
           </a:p>
           <a:p>
             <a:r>
@@ -9900,13 +9867,8 @@
           <a:p>
             <a:r>
               <a:rPr lang="pl-PL" dirty="0" smtClean="0"/>
-              <a:t>Podsumowanie </a:t>
-            </a:r>
-            <a:r>
-              <a:rPr lang="pl-PL" dirty="0" smtClean="0"/>
-              <a:t>projektu</a:t>
-            </a:r>
-            <a:endParaRPr lang="pl-PL" dirty="0" smtClean="0"/>
+              <a:t>Podsumowanie projektu</a:t>
+            </a:r>
           </a:p>
         </p:txBody>
       </p:sp>
@@ -10069,33 +10031,19 @@
           <a:p>
             <a:r>
               <a:rPr lang="pl-PL" dirty="0" smtClean="0"/>
-              <a:t>Wykorzystanie R do bardziej złożonych </a:t>
-            </a:r>
+              <a:t>Wykorzystanie R do bardziej złożonych manipulacji na danych,</a:t>
+            </a:r>
+          </a:p>
+          <a:p>
             <a:r>
               <a:rPr lang="pl-PL" dirty="0" smtClean="0"/>
-              <a:t>manipulacji na danych,</a:t>
-            </a:r>
-            <a:endParaRPr lang="pl-PL" dirty="0" smtClean="0"/>
+              <a:t>Wykorzystanie R jako interfejsu do Spark’a oraz Hadoop’a (sparklyr),</a:t>
+            </a:r>
           </a:p>
           <a:p>
             <a:r>
               <a:rPr lang="pl-PL" dirty="0" smtClean="0"/>
-              <a:t>Wykorzystanie R jako interfejsu do </a:t>
-            </a:r>
-            <a:r>
-              <a:rPr lang="pl-PL" dirty="0" smtClean="0"/>
-              <a:t>Spark’a oraz Hadoop’a (sparklyr),</a:t>
-            </a:r>
-            <a:endParaRPr lang="pl-PL" dirty="0" smtClean="0"/>
-          </a:p>
-          <a:p>
-            <a:r>
-              <a:rPr lang="pl-PL" dirty="0" smtClean="0"/>
-              <a:t>Wykorzystanie Sparka do uczenia maszynowego (biblioteka MLlib</a:t>
-            </a:r>
-            <a:r>
-              <a:rPr lang="pl-PL" dirty="0" smtClean="0"/>
-              <a:t>),</a:t>
+              <a:t>Wykorzystanie Sparka do uczenia maszynowego (biblioteka MLlib),</a:t>
             </a:r>
           </a:p>
           <a:p>
@@ -10103,16 +10051,11 @@
               <a:rPr lang="pl-PL" dirty="0" smtClean="0"/>
               <a:t>Weryfikacja/próba optymalizacji modeli utworzonych w Spark’u,</a:t>
             </a:r>
-            <a:endParaRPr lang="pl-PL" dirty="0" smtClean="0"/>
           </a:p>
           <a:p>
             <a:r>
               <a:rPr lang="pl-PL" dirty="0" smtClean="0"/>
-              <a:t>Napisanie pakietu w R ułatwiającego pracę z </a:t>
-            </a:r>
-            <a:r>
-              <a:rPr lang="pl-PL" dirty="0" smtClean="0"/>
-              <a:t>danymi.</a:t>
+              <a:t>Napisanie pakietu w R ułatwiającego pracę z danymi.</a:t>
             </a:r>
             <a:endParaRPr lang="en-GB" dirty="0"/>
           </a:p>
@@ -10200,15 +10143,7 @@
           <a:p>
             <a:r>
               <a:rPr lang="pl-PL" dirty="0" smtClean="0"/>
-              <a:t>Klaster obliczeniowy (</a:t>
-            </a:r>
-            <a:r>
-              <a:rPr lang="pl-PL" dirty="0" smtClean="0"/>
-              <a:t>zarówno dla </a:t>
-            </a:r>
-            <a:r>
-              <a:rPr lang="pl-PL" dirty="0" smtClean="0"/>
-              <a:t>Hadoop’a jak i Spark’a) składający się z 4 wirtualnych maszyn zainstalowanych na oprogramowaniu VirtualBox </a:t>
+              <a:t>Klaster obliczeniowy (zarówno dla Hadoop’a jak i Spark’a) składający się z 4 wirtualnych maszyn zainstalowanych na oprogramowaniu VirtualBox </a:t>
             </a:r>
           </a:p>
           <a:p>
@@ -10221,84 +10156,28 @@
             <a:pPr lvl="1"/>
             <a:r>
               <a:rPr lang="pl-PL" dirty="0" smtClean="0"/>
-              <a:t>Dane za pomocą </a:t>
-            </a:r>
+              <a:t>Dane za pomocą Apache Flume’a były ładowane na HDFS</a:t>
+            </a:r>
+          </a:p>
+          <a:p>
+            <a:pPr lvl="1"/>
             <a:r>
               <a:rPr lang="pl-PL" dirty="0" smtClean="0"/>
-              <a:t>Apache Flume’a </a:t>
-            </a:r>
-            <a:r>
-              <a:rPr lang="pl-PL" dirty="0" smtClean="0"/>
-              <a:t>były ładowane na HDFS</a:t>
-            </a:r>
-          </a:p>
-          <a:p>
-            <a:pPr lvl="1"/>
-            <a:r>
-              <a:rPr lang="pl-PL" dirty="0" smtClean="0"/>
-              <a:t>Dane poprzez RStudio (sparklyr) były odczytywane z HDFS</a:t>
-            </a:r>
-            <a:r>
-              <a:rPr lang="pl-PL" dirty="0" smtClean="0"/>
-              <a:t>,</a:t>
+              <a:t>Dane poprzez RStudio (sparklyr) były odczytywane z HDFS,</a:t>
             </a:r>
             <a:br>
               <a:rPr lang="pl-PL" dirty="0" smtClean="0"/>
             </a:br>
             <a:r>
               <a:rPr lang="pl-PL" dirty="0" smtClean="0"/>
-              <a:t>ładowane </a:t>
-            </a:r>
+              <a:t>ładowane do Apache Spark’a, a następnie do pamięci w celu wykonania określonych manipulacji</a:t>
+            </a:r>
+          </a:p>
+          <a:p>
+            <a:pPr lvl="1"/>
             <a:r>
               <a:rPr lang="pl-PL" dirty="0" smtClean="0"/>
-              <a:t>do </a:t>
-            </a:r>
-            <a:r>
-              <a:rPr lang="pl-PL" dirty="0" smtClean="0"/>
-              <a:t>Apache Spark’a, a </a:t>
-            </a:r>
-            <a:r>
-              <a:rPr lang="pl-PL" dirty="0" smtClean="0"/>
-              <a:t>następnie do pamięci </a:t>
-            </a:r>
-            <a:r>
-              <a:rPr lang="pl-PL" dirty="0" smtClean="0"/>
-              <a:t>w </a:t>
-            </a:r>
-            <a:r>
-              <a:rPr lang="pl-PL" dirty="0" smtClean="0"/>
-              <a:t>celu wykonania określonych manipulacji</a:t>
-            </a:r>
-          </a:p>
-          <a:p>
-            <a:pPr lvl="1"/>
-            <a:r>
-              <a:rPr lang="pl-PL" dirty="0" smtClean="0"/>
-              <a:t>Dane, po </a:t>
-            </a:r>
-            <a:r>
-              <a:rPr lang="pl-PL" dirty="0" smtClean="0"/>
-              <a:t>manipulacjach, </a:t>
-            </a:r>
-            <a:r>
-              <a:rPr lang="pl-PL" dirty="0" smtClean="0"/>
-              <a:t>(za pomocą </a:t>
-            </a:r>
-            <a:r>
-              <a:rPr lang="pl-PL" dirty="0" smtClean="0"/>
-              <a:t>sparklyr’a) </a:t>
-            </a:r>
-            <a:r>
-              <a:rPr lang="pl-PL" dirty="0" smtClean="0"/>
-              <a:t>były ładowane do </a:t>
-            </a:r>
-            <a:r>
-              <a:rPr lang="pl-PL" dirty="0" smtClean="0"/>
-              <a:t>Spark’a </a:t>
-            </a:r>
-            <a:r>
-              <a:rPr lang="pl-PL" dirty="0" smtClean="0"/>
-              <a:t>w celu przeprowadzenia na nich uczenia maszynowego,</a:t>
+              <a:t>Dane, po manipulacjach, (za pomocą sparklyr’a) były ładowane do Spark’a w celu przeprowadzenia na nich uczenia maszynowego,</a:t>
             </a:r>
           </a:p>
           <a:p>
@@ -11044,27 +10923,18 @@
           <a:p>
             <a:r>
               <a:rPr lang="pl-PL" dirty="0" smtClean="0"/>
-              <a:t>Po zapoznaniu się z  danymi, które składały się ze 116 kolumn dyskretnych oraz 14 kolumn ciągłych postanowiono w fazie wstępnej</a:t>
-            </a:r>
+              <a:t>Po zapoznaniu się z  danymi, które składały się ze 116 kolumn dyskretnych oraz 14 kolumn ciągłych postanowiono w fazie wstępnej:</a:t>
+            </a:r>
+          </a:p>
+          <a:p>
+            <a:endParaRPr lang="pl-PL" dirty="0" smtClean="0"/>
+          </a:p>
+          <a:p>
+            <a:pPr lvl="1"/>
             <a:r>
               <a:rPr lang="pl-PL" dirty="0" smtClean="0"/>
-              <a:t>:</a:t>
-            </a:r>
-          </a:p>
-          <a:p>
-            <a:endParaRPr lang="pl-PL" dirty="0" smtClean="0"/>
-          </a:p>
-          <a:p>
-            <a:pPr lvl="1"/>
-            <a:r>
-              <a:rPr lang="pl-PL" dirty="0" smtClean="0"/>
-              <a:t>Dokonać prostej faktoryzacji (prosta zmiana litery -&gt; cyfry/liczby, w zależności od ilości poziomów zmiennej</a:t>
-            </a:r>
-            <a:r>
-              <a:rPr lang="pl-PL" dirty="0" smtClean="0"/>
-              <a:t>) – w skryptach w R oznaczane jako „Case1”</a:t>
-            </a:r>
-            <a:endParaRPr lang="pl-PL" dirty="0" smtClean="0"/>
+              <a:t>Dokonać prostej faktoryzacji (prosta zmiana litery -&gt; cyfry/liczby, w zależności od ilości poziomów zmiennej) – w skryptach w R oznaczane jako „Case1”</a:t>
+            </a:r>
           </a:p>
         </p:txBody>
       </p:sp>
@@ -11194,19 +11064,7 @@
             <a:pPr lvl="1"/>
             <a:r>
               <a:rPr lang="pl-PL" dirty="0" smtClean="0"/>
-              <a:t>Dokonać </a:t>
-            </a:r>
-            <a:r>
-              <a:rPr lang="pl-PL" dirty="0" smtClean="0"/>
-              <a:t>faktoryzacji przy założeniu, że poziomy zmiennych są globalne (tzn., </a:t>
-            </a:r>
-            <a:r>
-              <a:rPr lang="pl-PL" dirty="0" smtClean="0"/>
-              <a:t>że </a:t>
-            </a:r>
-            <a:r>
-              <a:rPr lang="pl-PL" dirty="0" smtClean="0"/>
-              <a:t>A zawsze będzie reprezentowane przez 1, B przez 2</a:t>
+              <a:t>Dokonać faktoryzacji przy założeniu, że poziomy zmiennych są globalne (tzn., że A zawsze będzie reprezentowane przez 1, B przez 2</a:t>
             </a:r>
             <a:r>
               <a:rPr lang="pl-PL" dirty="0"/>

</xml_diff>